<commit_message>
made feedback changes, experimenting with classes
</commit_message>
<xml_diff>
--- a/modelling_presentation_feedbackrequested.pptx
+++ b/modelling_presentation_feedbackrequested.pptx
@@ -287,7 +287,7 @@
           <a:p>
             <a:fld id="{AC60FACE-2AB3-482F-9DAD-19ECD275A4C6}" type="datetimeFigureOut">
               <a:rPr lang="en-US" smtClean="0"/>
-              <a:t>11/2/2020</a:t>
+              <a:t>11/18/2020</a:t>
             </a:fld>
             <a:endParaRPr lang="en-US"/>
           </a:p>
@@ -1598,7 +1598,7 @@
           <a:p>
             <a:fld id="{ED291B17-9318-49DB-B28B-6E5994AE9581}" type="datetime1">
               <a:rPr lang="en-US" smtClean="0"/>
-              <a:t>11/2/2020</a:t>
+              <a:t>11/18/2020</a:t>
             </a:fld>
             <a:endParaRPr lang="en-US"/>
           </a:p>
@@ -1799,7 +1799,7 @@
           <a:p>
             <a:fld id="{2CED4963-E985-44C4-B8C4-FDD613B7C2F8}" type="datetime1">
               <a:rPr lang="en-US" smtClean="0"/>
-              <a:t>11/2/2020</a:t>
+              <a:t>11/18/2020</a:t>
             </a:fld>
             <a:endParaRPr lang="en-US"/>
           </a:p>
@@ -2159,7 +2159,7 @@
           <a:p>
             <a:fld id="{ED291B17-9318-49DB-B28B-6E5994AE9581}" type="datetime1">
               <a:rPr lang="en-US" smtClean="0"/>
-              <a:t>11/2/2020</a:t>
+              <a:t>11/18/2020</a:t>
             </a:fld>
             <a:endParaRPr lang="en-US"/>
           </a:p>
@@ -2355,7 +2355,7 @@
           <a:p>
             <a:fld id="{78DD82B9-B8EE-4375-B6FF-88FA6ABB15D9}" type="datetime1">
               <a:rPr lang="en-US" smtClean="0"/>
-              <a:t>11/2/2020</a:t>
+              <a:t>11/18/2020</a:t>
             </a:fld>
             <a:endParaRPr lang="en-US"/>
           </a:p>
@@ -2666,7 +2666,7 @@
           <a:p>
             <a:fld id="{B2497495-0637-405E-AE64-5CC7506D51F5}" type="datetime1">
               <a:rPr lang="en-US" smtClean="0"/>
-              <a:t>11/2/2020</a:t>
+              <a:t>11/18/2020</a:t>
             </a:fld>
             <a:endParaRPr lang="en-US"/>
           </a:p>
@@ -2916,7 +2916,7 @@
           <a:p>
             <a:fld id="{7BFFD690-9426-415D-8B65-26881E07B2D4}" type="datetime1">
               <a:rPr lang="en-US" smtClean="0"/>
-              <a:t>11/2/2020</a:t>
+              <a:t>11/18/2020</a:t>
             </a:fld>
             <a:endParaRPr lang="en-US"/>
           </a:p>
@@ -3335,7 +3335,7 @@
           <a:p>
             <a:fld id="{04C4989A-474C-40DE-95B9-011C28B71673}" type="datetime1">
               <a:rPr lang="en-US" smtClean="0"/>
-              <a:t>11/2/2020</a:t>
+              <a:t>11/18/2020</a:t>
             </a:fld>
             <a:endParaRPr lang="en-US"/>
           </a:p>
@@ -3457,7 +3457,7 @@
           <a:p>
             <a:fld id="{5DB4ED54-5B5E-4A04-93D3-5772E3CE3818}" type="datetime1">
               <a:rPr lang="en-US" smtClean="0"/>
-              <a:t>11/2/2020</a:t>
+              <a:t>11/18/2020</a:t>
             </a:fld>
             <a:endParaRPr lang="en-US"/>
           </a:p>
@@ -3552,7 +3552,7 @@
           <a:p>
             <a:fld id="{4EDE50D6-574B-40AF-946F-D52A04ADE379}" type="datetime1">
               <a:rPr lang="en-US" smtClean="0"/>
-              <a:t>11/2/2020</a:t>
+              <a:t>11/18/2020</a:t>
             </a:fld>
             <a:endParaRPr lang="en-US"/>
           </a:p>
@@ -3927,7 +3927,7 @@
           <a:p>
             <a:fld id="{D82884F1-FFEA-405F-9602-3DCA865EDA4E}" type="datetime1">
               <a:rPr lang="en-US" smtClean="0"/>
-              <a:t>11/2/2020</a:t>
+              <a:t>11/18/2020</a:t>
             </a:fld>
             <a:endParaRPr lang="en-US"/>
           </a:p>
@@ -4218,7 +4218,7 @@
           <a:p>
             <a:fld id="{7E18DB4A-8810-4A10-AD5C-D5E2C667F5B3}" type="datetime1">
               <a:rPr lang="en-US" smtClean="0"/>
-              <a:t>11/2/2020</a:t>
+              <a:t>11/18/2020</a:t>
             </a:fld>
             <a:endParaRPr lang="en-US"/>
           </a:p>
@@ -4431,7 +4431,7 @@
           <a:p>
             <a:fld id="{ED291B17-9318-49DB-B28B-6E5994AE9581}" type="datetime1">
               <a:rPr lang="en-US" smtClean="0"/>
-              <a:t>11/2/2020</a:t>
+              <a:t>11/18/2020</a:t>
             </a:fld>
             <a:endParaRPr lang="en-US"/>
           </a:p>
@@ -5386,7 +5386,7 @@
         </p:spPr>
         <p:txBody>
           <a:bodyPr>
-            <a:normAutofit/>
+            <a:normAutofit fontScale="92500"/>
           </a:bodyPr>
           <a:lstStyle/>
           <a:p>
@@ -5449,8 +5449,19 @@
             </a:r>
           </a:p>
           <a:p>
-            <a:pPr marL="629920" lvl="1" indent="-305435"/>
-            <a:endParaRPr lang="en-US" dirty="0"/>
+            <a:pPr marL="899920" lvl="2" indent="-305435"/>
+            <a:r>
+              <a:rPr lang="en-US" dirty="0"/>
+              <a:t>A region is an area denoted by a number and operator (or just a number in the top corner). </a:t>
+            </a:r>
+            <a:r>
+              <a:rPr lang="en-US" dirty="0" err="1"/>
+              <a:t>Ie</a:t>
+            </a:r>
+            <a:r>
+              <a:rPr lang="en-US" dirty="0"/>
+              <a:t>. “2-” is a region consisting of the first 2 squares of the grid</a:t>
+            </a:r>
           </a:p>
           <a:p>
             <a:pPr marL="305435" indent="-305435"/>
@@ -5788,10 +5799,10 @@
       </p:sp>
       <p:pic>
         <p:nvPicPr>
-          <p:cNvPr id="4" name="Picture 2" descr="How to Solve Puzzles | Puzzazz | The best way to solve puzzles in the  digital world">
+          <p:cNvPr id="5" name="Picture 4" descr="KenKen Puzzle Official Site - Free Math Puzzles That Make You Smarter!">
             <a:extLst>
               <a:ext uri="{FF2B5EF4-FFF2-40B4-BE49-F238E27FC236}">
-                <a16:creationId xmlns:a16="http://schemas.microsoft.com/office/drawing/2014/main" id="{62396C91-1154-47F9-B235-D050779ACB54}"/>
+                <a16:creationId xmlns:a16="http://schemas.microsoft.com/office/drawing/2014/main" id="{01D5BA88-1324-4488-8A76-65C612F95BF7}"/>
               </a:ext>
             </a:extLst>
           </p:cNvPr>
@@ -5815,55 +5826,8 @@
         </p:blipFill>
         <p:spPr bwMode="auto">
           <a:xfrm>
-            <a:off x="9564673" y="3583479"/>
-            <a:ext cx="1665257" cy="1665257"/>
-          </a:xfrm>
-          <a:prstGeom prst="rect">
-            <a:avLst/>
-          </a:prstGeom>
-          <a:noFill/>
-          <a:extLst>
-            <a:ext uri="{909E8E84-426E-40DD-AFC4-6F175D3DCCD1}">
-              <a14:hiddenFill xmlns:a14="http://schemas.microsoft.com/office/drawing/2010/main">
-                <a:solidFill>
-                  <a:srgbClr val="FFFFFF"/>
-                </a:solidFill>
-              </a14:hiddenFill>
-            </a:ext>
-          </a:extLst>
-        </p:spPr>
-      </p:pic>
-      <p:pic>
-        <p:nvPicPr>
-          <p:cNvPr id="5" name="Picture 4" descr="KenKen Puzzle Official Site - Free Math Puzzles That Make You Smarter!">
-            <a:extLst>
-              <a:ext uri="{FF2B5EF4-FFF2-40B4-BE49-F238E27FC236}">
-                <a16:creationId xmlns:a16="http://schemas.microsoft.com/office/drawing/2014/main" id="{01D5BA88-1324-4488-8A76-65C612F95BF7}"/>
-              </a:ext>
-            </a:extLst>
-          </p:cNvPr>
-          <p:cNvPicPr>
-            <a:picLocks noChangeAspect="1" noChangeArrowheads="1"/>
-          </p:cNvPicPr>
-          <p:nvPr/>
-        </p:nvPicPr>
-        <p:blipFill>
-          <a:blip r:embed="rId6">
-            <a:extLst>
-              <a:ext uri="{28A0092B-C50C-407E-A947-70E740481C1C}">
-                <a14:useLocalDpi xmlns:a14="http://schemas.microsoft.com/office/drawing/2010/main" val="0"/>
-              </a:ext>
-            </a:extLst>
-          </a:blip>
-          <a:srcRect/>
-          <a:stretch>
-            <a:fillRect/>
-          </a:stretch>
-        </p:blipFill>
-        <p:spPr bwMode="auto">
-          <a:xfrm>
-            <a:off x="9550786" y="1655542"/>
-            <a:ext cx="1665257" cy="1665257"/>
+            <a:off x="9550786" y="1323343"/>
+            <a:ext cx="1926511" cy="1926511"/>
           </a:xfrm>
           <a:prstGeom prst="rect">
             <a:avLst/>
@@ -5895,7 +5859,7 @@
           <p:nvPr/>
         </p:nvPicPr>
         <p:blipFill>
-          <a:blip r:embed="rId7">
+          <a:blip r:embed="rId6">
             <a:extLst>
               <a:ext uri="{28A0092B-C50C-407E-A947-70E740481C1C}">
                 <a14:useLocalDpi xmlns:a14="http://schemas.microsoft.com/office/drawing/2010/main" val="0"/>
@@ -5925,6 +5889,36 @@
               </a14:hiddenFill>
             </a:ext>
           </a:extLst>
+        </p:spPr>
+      </p:pic>
+      <p:pic>
+        <p:nvPicPr>
+          <p:cNvPr id="8" name="Picture 7">
+            <a:extLst>
+              <a:ext uri="{FF2B5EF4-FFF2-40B4-BE49-F238E27FC236}">
+                <a16:creationId xmlns:a16="http://schemas.microsoft.com/office/drawing/2014/main" id="{80ED02B6-D959-4485-9F8C-E5922EB8ED71}"/>
+              </a:ext>
+            </a:extLst>
+          </p:cNvPr>
+          <p:cNvPicPr>
+            <a:picLocks noChangeAspect="1"/>
+          </p:cNvPicPr>
+          <p:nvPr/>
+        </p:nvPicPr>
+        <p:blipFill>
+          <a:blip r:embed="rId7"/>
+          <a:stretch>
+            <a:fillRect/>
+          </a:stretch>
+        </p:blipFill>
+        <p:spPr>
+          <a:xfrm>
+            <a:off x="9201960" y="3358055"/>
+            <a:ext cx="2432380" cy="2424135"/>
+          </a:xfrm>
+          <a:prstGeom prst="rect">
+            <a:avLst/>
+          </a:prstGeom>
         </p:spPr>
       </p:pic>
     </p:spTree>
@@ -5999,8 +5993,8 @@
           </a:p>
         </p:txBody>
       </p:sp>
-      <mc:AlternateContent xmlns:mc="http://schemas.openxmlformats.org/markup-compatibility/2006" xmlns:a14="http://schemas.microsoft.com/office/drawing/2010/main">
-        <mc:Choice Requires="a14">
+      <mc:AlternateContent xmlns:mc="http://schemas.openxmlformats.org/markup-compatibility/2006">
+        <mc:Choice xmlns:a14="http://schemas.microsoft.com/office/drawing/2010/main" Requires="a14">
           <p:sp>
             <p:nvSpPr>
               <p:cNvPr id="3" name="Content Placeholder 2">
@@ -6019,7 +6013,7 @@
             </p:nvSpPr>
             <p:spPr>
               <a:xfrm>
-                <a:off x="581193" y="1944209"/>
+                <a:off x="581193" y="1392416"/>
                 <a:ext cx="8380450" cy="4216894"/>
               </a:xfrm>
             </p:spPr>
@@ -6187,12 +6181,20 @@
                 </a:r>
                 <a:r>
                   <a:rPr lang="en-CA" b="0" baseline="-25000" dirty="0"/>
-                  <a:t>1,-</a:t>
+                  <a:t>1, -, 2,-</a:t>
                 </a:r>
                 <a:r>
                   <a:rPr lang="en-CA" b="0" dirty="0"/>
-                  <a:t> is true</a:t>
+                  <a:t> is true if the numbers 1 and 3 are filled in because they subtract to 2</a:t>
                 </a:r>
+              </a:p>
+              <a:p>
+                <a:pPr lvl="1"/>
+                <a:r>
+                  <a:rPr lang="en-CA" dirty="0"/>
+                  <a:t>Regions will be numbered from left to right</a:t>
+                </a:r>
+                <a:endParaRPr lang="en-CA" b="0" dirty="0"/>
               </a:p>
               <a:p>
                 <a14:m>
@@ -6291,29 +6293,12 @@
                   <a:rPr lang="en-CA" dirty="0"/>
                   <a:t> is true</a:t>
                 </a:r>
-              </a:p>
-              <a:p>
-                <a:pPr marL="0" indent="0">
-                  <a:buNone/>
-                </a:pPr>
-                <a:endParaRPr lang="en-CA" dirty="0"/>
-              </a:p>
-              <a:p>
-                <a:endParaRPr lang="en-CA" dirty="0"/>
-              </a:p>
-              <a:p>
-                <a:pPr marL="324000" lvl="1" indent="0">
-                  <a:buNone/>
-                </a:pPr>
-                <a:endParaRPr lang="en-US" dirty="0"/>
-              </a:p>
-              <a:p>
                 <a:endParaRPr lang="en-US" dirty="0"/>
               </a:p>
             </p:txBody>
           </p:sp>
         </mc:Choice>
-        <mc:Fallback xmlns="">
+        <mc:Fallback>
           <p:sp>
             <p:nvSpPr>
               <p:cNvPr id="3" name="Content Placeholder 2">
@@ -6332,7 +6317,7 @@
             </p:nvSpPr>
             <p:spPr>
               <a:xfrm>
-                <a:off x="581193" y="1944209"/>
+                <a:off x="581193" y="1392416"/>
                 <a:ext cx="8380450" cy="4216894"/>
               </a:xfrm>
               <a:blipFill>
@@ -6386,7 +6371,7 @@
         </p:blipFill>
         <p:spPr bwMode="auto">
           <a:xfrm>
-            <a:off x="9061228" y="2276364"/>
+            <a:off x="9140056" y="1006161"/>
             <a:ext cx="2305272" cy="2305272"/>
           </a:xfrm>
           <a:prstGeom prst="rect">
@@ -6402,6 +6387,36 @@
               </a14:hiddenFill>
             </a:ext>
           </a:extLst>
+        </p:spPr>
+      </p:pic>
+      <p:pic>
+        <p:nvPicPr>
+          <p:cNvPr id="4" name="Picture 3">
+            <a:extLst>
+              <a:ext uri="{FF2B5EF4-FFF2-40B4-BE49-F238E27FC236}">
+                <a16:creationId xmlns:a16="http://schemas.microsoft.com/office/drawing/2014/main" id="{BFCDD9FC-A83C-41BA-8DE7-FA0E3EF18E6B}"/>
+              </a:ext>
+            </a:extLst>
+          </p:cNvPr>
+          <p:cNvPicPr>
+            <a:picLocks noChangeAspect="1"/>
+          </p:cNvPicPr>
+          <p:nvPr/>
+        </p:nvPicPr>
+        <p:blipFill>
+          <a:blip r:embed="rId5"/>
+          <a:stretch>
+            <a:fillRect/>
+          </a:stretch>
+        </p:blipFill>
+        <p:spPr>
+          <a:xfrm>
+            <a:off x="8800932" y="3603679"/>
+            <a:ext cx="2809875" cy="2800350"/>
+          </a:xfrm>
+          <a:prstGeom prst="rect">
+            <a:avLst/>
+          </a:prstGeom>
         </p:spPr>
       </p:pic>
     </p:spTree>
@@ -6559,7 +6574,7 @@
         </p:blipFill>
         <p:spPr>
           <a:xfrm>
-            <a:off x="6095999" y="3561234"/>
+            <a:off x="6232424" y="3703123"/>
             <a:ext cx="2809875" cy="2800350"/>
           </a:xfrm>
           <a:prstGeom prst="rect">
@@ -6661,53 +6676,6 @@
           </a:extLst>
         </p:spPr>
       </p:pic>
-      <p:pic>
-        <p:nvPicPr>
-          <p:cNvPr id="6" name="Picture 2" descr="KenKen Puzzle Official Site - Free Math Puzzles That Make You Smarter!">
-            <a:extLst>
-              <a:ext uri="{FF2B5EF4-FFF2-40B4-BE49-F238E27FC236}">
-                <a16:creationId xmlns:a16="http://schemas.microsoft.com/office/drawing/2014/main" id="{70FAAB63-E4CC-45EA-A090-70B8F3014F9A}"/>
-              </a:ext>
-            </a:extLst>
-          </p:cNvPr>
-          <p:cNvPicPr>
-            <a:picLocks noChangeAspect="1" noChangeArrowheads="1"/>
-          </p:cNvPicPr>
-          <p:nvPr/>
-        </p:nvPicPr>
-        <p:blipFill>
-          <a:blip r:embed="rId6">
-            <a:extLst>
-              <a:ext uri="{28A0092B-C50C-407E-A947-70E740481C1C}">
-                <a14:useLocalDpi xmlns:a14="http://schemas.microsoft.com/office/drawing/2010/main" val="0"/>
-              </a:ext>
-            </a:extLst>
-          </a:blip>
-          <a:srcRect/>
-          <a:stretch>
-            <a:fillRect/>
-          </a:stretch>
-        </p:blipFill>
-        <p:spPr bwMode="auto">
-          <a:xfrm>
-            <a:off x="9235203" y="4510557"/>
-            <a:ext cx="1665256" cy="1665256"/>
-          </a:xfrm>
-          <a:prstGeom prst="rect">
-            <a:avLst/>
-          </a:prstGeom>
-          <a:noFill/>
-          <a:extLst>
-            <a:ext uri="{909E8E84-426E-40DD-AFC4-6F175D3DCCD1}">
-              <a14:hiddenFill xmlns:a14="http://schemas.microsoft.com/office/drawing/2010/main">
-                <a:solidFill>
-                  <a:srgbClr val="FFFFFF"/>
-                </a:solidFill>
-              </a14:hiddenFill>
-            </a:ext>
-          </a:extLst>
-        </p:spPr>
-      </p:pic>
     </p:spTree>
     <p:extLst>
       <p:ext uri="{BB962C8B-B14F-4D97-AF65-F5344CB8AC3E}">
@@ -6775,8 +6743,8 @@
           </a:p>
         </p:txBody>
       </p:sp>
-      <mc:AlternateContent xmlns:mc="http://schemas.openxmlformats.org/markup-compatibility/2006">
-        <mc:Choice xmlns:a14="http://schemas.microsoft.com/office/drawing/2010/main" Requires="a14">
+      <mc:AlternateContent xmlns:mc="http://schemas.openxmlformats.org/markup-compatibility/2006" xmlns:a14="http://schemas.microsoft.com/office/drawing/2010/main">
+        <mc:Choice Requires="a14">
           <p:sp>
             <p:nvSpPr>
               <p:cNvPr id="3" name="Content Placeholder 2">
@@ -6937,7 +6905,7 @@
             </p:txBody>
           </p:sp>
         </mc:Choice>
-        <mc:Fallback>
+        <mc:Fallback xmlns="">
           <p:sp>
             <p:nvSpPr>
               <p:cNvPr id="3" name="Content Placeholder 2">
@@ -7430,7 +7398,7 @@
             </a:r>
             <a:r>
               <a:rPr lang="en-US" sz="1600" dirty="0"/>
-              <a:t>, x)) </a:t>
+              <a:t>, z)) </a:t>
             </a:r>
           </a:p>
           <a:p>
@@ -8826,21 +8794,6 @@
 </file>
 
 <file path=customXml/item1.xml><?xml version="1.0" encoding="utf-8"?>
-<p:properties xmlns:p="http://schemas.microsoft.com/office/2006/metadata/properties" xmlns:xsi="http://www.w3.org/2001/XMLSchema-instance" xmlns:pc="http://schemas.microsoft.com/office/infopath/2007/PartnerControls">
-  <documentManagement/>
-</p:properties>
-</file>
-
-<file path=customXml/item2.xml><?xml version="1.0" encoding="utf-8"?>
-<?mso-contentType ?>
-<FormTemplates xmlns="http://schemas.microsoft.com/sharepoint/v3/contenttype/forms">
-  <Display>DocumentLibraryForm</Display>
-  <Edit>DocumentLibraryForm</Edit>
-  <New>DocumentLibraryForm</New>
-</FormTemplates>
-</file>
-
-<file path=customXml/item3.xml><?xml version="1.0" encoding="utf-8"?>
 <ct:contentTypeSchema xmlns:ct="http://schemas.microsoft.com/office/2006/metadata/contentType" xmlns:ma="http://schemas.microsoft.com/office/2006/metadata/properties/metaAttributes" ct:_="" ma:_="" ma:contentTypeName="Document" ma:contentTypeID="0x0101006B5842DCF547FF45B73480D12694CEC7" ma:contentTypeVersion="5" ma:contentTypeDescription="Create a new document." ma:contentTypeScope="" ma:versionID="b7e1340f9f584ec9820a9b319f9fbbb4">
   <xsd:schema xmlns:xsd="http://www.w3.org/2001/XMLSchema" xmlns:xs="http://www.w3.org/2001/XMLSchema" xmlns:p="http://schemas.microsoft.com/office/2006/metadata/properties" xmlns:ns3="c52a3698-a5ed-4c71-b135-61fe17eb7543" xmlns:ns4="0b7b05d5-738f-46ad-bac7-cc10d4d5c14a" targetNamespace="http://schemas.microsoft.com/office/2006/metadata/properties" ma:root="true" ma:fieldsID="33ff18dcb277ce68c80ee8f2a79785cb" ns3:_="" ns4:_="">
     <xsd:import namespace="c52a3698-a5ed-4c71-b135-61fe17eb7543"/>
@@ -9011,32 +8964,22 @@
 </ct:contentTypeSchema>
 </file>
 
-<file path=customXml/itemProps1.xml><?xml version="1.0" encoding="utf-8"?>
-<ds:datastoreItem xmlns:ds="http://schemas.openxmlformats.org/officeDocument/2006/customXml" ds:itemID="{9194EB7B-8D5F-498D-B261-9A34E01FC5ED}">
-  <ds:schemaRefs>
-    <ds:schemaRef ds:uri="0b7b05d5-738f-46ad-bac7-cc10d4d5c14a"/>
-    <ds:schemaRef ds:uri="c52a3698-a5ed-4c71-b135-61fe17eb7543"/>
-    <ds:schemaRef ds:uri="http://purl.org/dc/dcmitype/"/>
-    <ds:schemaRef ds:uri="http://purl.org/dc/elements/1.1/"/>
-    <ds:schemaRef ds:uri="http://purl.org/dc/terms/"/>
-    <ds:schemaRef ds:uri="http://schemas.microsoft.com/office/2006/documentManagement/types"/>
-    <ds:schemaRef ds:uri="http://schemas.microsoft.com/office/2006/metadata/properties"/>
-    <ds:schemaRef ds:uri="http://schemas.microsoft.com/office/infopath/2007/PartnerControls"/>
-    <ds:schemaRef ds:uri="http://schemas.openxmlformats.org/package/2006/metadata/core-properties"/>
-    <ds:schemaRef ds:uri="http://www.w3.org/XML/1998/namespace"/>
-  </ds:schemaRefs>
-</ds:datastoreItem>
+<file path=customXml/item2.xml><?xml version="1.0" encoding="utf-8"?>
+<?mso-contentType ?>
+<FormTemplates xmlns="http://schemas.microsoft.com/sharepoint/v3/contenttype/forms">
+  <Display>DocumentLibraryForm</Display>
+  <Edit>DocumentLibraryForm</Edit>
+  <New>DocumentLibraryForm</New>
+</FormTemplates>
 </file>
 
-<file path=customXml/itemProps2.xml><?xml version="1.0" encoding="utf-8"?>
-<ds:datastoreItem xmlns:ds="http://schemas.openxmlformats.org/officeDocument/2006/customXml" ds:itemID="{AC4A259D-CCA8-4BE6-80D5-F52784822BEE}">
-  <ds:schemaRefs>
-    <ds:schemaRef ds:uri="http://schemas.microsoft.com/sharepoint/v3/contenttype/forms"/>
-  </ds:schemaRefs>
-</ds:datastoreItem>
+<file path=customXml/item3.xml><?xml version="1.0" encoding="utf-8"?>
+<p:properties xmlns:p="http://schemas.microsoft.com/office/2006/metadata/properties" xmlns:xsi="http://www.w3.org/2001/XMLSchema-instance" xmlns:pc="http://schemas.microsoft.com/office/infopath/2007/PartnerControls">
+  <documentManagement/>
+</p:properties>
 </file>
 
-<file path=customXml/itemProps3.xml><?xml version="1.0" encoding="utf-8"?>
+<file path=customXml/itemProps1.xml><?xml version="1.0" encoding="utf-8"?>
 <ds:datastoreItem xmlns:ds="http://schemas.openxmlformats.org/officeDocument/2006/customXml" ds:itemID="{3DD6D42C-C2DA-4E92-AFF5-17F02C8A01E6}">
   <ds:schemaRefs>
     <ds:schemaRef ds:uri="0b7b05d5-738f-46ad-bac7-cc10d4d5c14a"/>
@@ -9053,4 +8996,29 @@
     <ds:schemaRef ds:uri="http://www.w3.org/2001/XMLSchema"/>
   </ds:schemaRefs>
 </ds:datastoreItem>
+</file>
+
+<file path=customXml/itemProps2.xml><?xml version="1.0" encoding="utf-8"?>
+<ds:datastoreItem xmlns:ds="http://schemas.openxmlformats.org/officeDocument/2006/customXml" ds:itemID="{AC4A259D-CCA8-4BE6-80D5-F52784822BEE}">
+  <ds:schemaRefs>
+    <ds:schemaRef ds:uri="http://schemas.microsoft.com/sharepoint/v3/contenttype/forms"/>
+  </ds:schemaRefs>
+</ds:datastoreItem>
+</file>
+
+<file path=customXml/itemProps3.xml><?xml version="1.0" encoding="utf-8"?>
+<ds:datastoreItem xmlns:ds="http://schemas.openxmlformats.org/officeDocument/2006/customXml" ds:itemID="{9194EB7B-8D5F-498D-B261-9A34E01FC5ED}">
+  <ds:schemaRefs>
+    <ds:schemaRef ds:uri="0b7b05d5-738f-46ad-bac7-cc10d4d5c14a"/>
+    <ds:schemaRef ds:uri="c52a3698-a5ed-4c71-b135-61fe17eb7543"/>
+    <ds:schemaRef ds:uri="http://purl.org/dc/dcmitype/"/>
+    <ds:schemaRef ds:uri="http://purl.org/dc/elements/1.1/"/>
+    <ds:schemaRef ds:uri="http://purl.org/dc/terms/"/>
+    <ds:schemaRef ds:uri="http://schemas.microsoft.com/office/2006/documentManagement/types"/>
+    <ds:schemaRef ds:uri="http://schemas.microsoft.com/office/2006/metadata/properties"/>
+    <ds:schemaRef ds:uri="http://schemas.microsoft.com/office/infopath/2007/PartnerControls"/>
+    <ds:schemaRef ds:uri="http://schemas.openxmlformats.org/package/2006/metadata/core-properties"/>
+    <ds:schemaRef ds:uri="http://www.w3.org/XML/1998/namespace"/>
+  </ds:schemaRefs>
+</ds:datastoreItem>
 </file>
</xml_diff>